<commit_message>
Halem updated the presentation
</commit_message>
<xml_diff>
--- a/Final Version_ALX1_AIS3_S1e/IBM Data Science Final Project Graduation.pptx
+++ b/Final Version_ALX1_AIS3_S1e/IBM Data Science Final Project Graduation.pptx
@@ -1,40 +1,40 @@
 
 <file path=ppt/presentation.xml><?xml version="1.0" encoding="utf-8"?>
-<p:presentation xmlns:a="http://schemas.openxmlformats.org/drawingml/2006/main" xmlns:r="http://schemas.openxmlformats.org/officeDocument/2006/relationships" xmlns:p="http://schemas.openxmlformats.org/presentationml/2006/main" saveSubsetFonts="1" autoCompressPictures="0">
+<p:presentation xmlns:a="http://schemas.openxmlformats.org/drawingml/2006/main" xmlns:r="http://schemas.openxmlformats.org/officeDocument/2006/relationships" xmlns:p="http://schemas.openxmlformats.org/presentationml/2006/main" autoCompressPictures="0">
   <p:sldMasterIdLst>
     <p:sldMasterId id="2147483648" r:id="rId1"/>
   </p:sldMasterIdLst>
   <p:notesMasterIdLst>
-    <p:notesMasterId r:id="rId29"/>
+    <p:notesMasterId r:id="rId4"/>
   </p:notesMasterIdLst>
   <p:sldIdLst>
-    <p:sldId id="256" r:id="rId2"/>
-    <p:sldId id="257" r:id="rId3"/>
-    <p:sldId id="258" r:id="rId4"/>
-    <p:sldId id="259" r:id="rId5"/>
-    <p:sldId id="260" r:id="rId6"/>
-    <p:sldId id="261" r:id="rId7"/>
-    <p:sldId id="262" r:id="rId8"/>
-    <p:sldId id="263" r:id="rId9"/>
-    <p:sldId id="264" r:id="rId10"/>
-    <p:sldId id="265" r:id="rId11"/>
-    <p:sldId id="266" r:id="rId12"/>
-    <p:sldId id="267" r:id="rId13"/>
-    <p:sldId id="268" r:id="rId14"/>
-    <p:sldId id="269" r:id="rId15"/>
-    <p:sldId id="270" r:id="rId16"/>
-    <p:sldId id="271" r:id="rId17"/>
-    <p:sldId id="272" r:id="rId18"/>
-    <p:sldId id="273" r:id="rId19"/>
-    <p:sldId id="274" r:id="rId20"/>
-    <p:sldId id="275" r:id="rId21"/>
-    <p:sldId id="276" r:id="rId22"/>
-    <p:sldId id="277" r:id="rId23"/>
-    <p:sldId id="278" r:id="rId24"/>
-    <p:sldId id="279" r:id="rId25"/>
-    <p:sldId id="280" r:id="rId26"/>
-    <p:sldId id="281" r:id="rId27"/>
-    <p:sldId id="282" r:id="rId28"/>
+    <p:sldId id="256" r:id="rId3"/>
+    <p:sldId id="257" r:id="rId5"/>
+    <p:sldId id="258" r:id="rId6"/>
+    <p:sldId id="259" r:id="rId7"/>
+    <p:sldId id="260" r:id="rId8"/>
+    <p:sldId id="261" r:id="rId9"/>
+    <p:sldId id="262" r:id="rId10"/>
+    <p:sldId id="263" r:id="rId11"/>
+    <p:sldId id="264" r:id="rId12"/>
+    <p:sldId id="265" r:id="rId13"/>
+    <p:sldId id="266" r:id="rId14"/>
+    <p:sldId id="267" r:id="rId15"/>
+    <p:sldId id="268" r:id="rId16"/>
+    <p:sldId id="269" r:id="rId17"/>
+    <p:sldId id="270" r:id="rId18"/>
+    <p:sldId id="271" r:id="rId19"/>
+    <p:sldId id="272" r:id="rId20"/>
+    <p:sldId id="273" r:id="rId21"/>
+    <p:sldId id="274" r:id="rId22"/>
+    <p:sldId id="275" r:id="rId23"/>
+    <p:sldId id="276" r:id="rId24"/>
+    <p:sldId id="277" r:id="rId25"/>
+    <p:sldId id="278" r:id="rId26"/>
+    <p:sldId id="279" r:id="rId27"/>
+    <p:sldId id="280" r:id="rId28"/>
+    <p:sldId id="281" r:id="rId29"/>
+    <p:sldId id="282" r:id="rId30"/>
   </p:sldIdLst>
   <p:sldSz cx="9144000" cy="5143500" type="screen16x9"/>
   <p:notesSz cx="5143500" cy="9144000"/>
@@ -130,11 +130,6 @@
       </a:defRPr>
     </a:lvl9pPr>
   </p:defaultTextStyle>
-  <p:extLst>
-    <p:ext uri="{EFAFB233-063F-42B5-8137-9DF3F51BA10A}">
-      <p15:sldGuideLst xmlns:p15="http://schemas.microsoft.com/office/powerpoint/2012/main"/>
-    </p:ext>
-  </p:extLst>
 </p:presentation>
 </file>
 
@@ -161,11 +156,6 @@
         </a:xfrm>
       </p:grpSpPr>
     </p:spTree>
-    <p:extLst>
-      <p:ext uri="{BB962C8B-B14F-4D97-AF65-F5344CB8AC3E}">
-        <p14:creationId xmlns:p14="http://schemas.microsoft.com/office/powerpoint/2010/main" val="2371131884"/>
-      </p:ext>
-    </p:extLst>
   </p:cSld>
   <p:clrMap bg1="lt1" tx1="dk1" bg2="lt2" tx2="dk2" accent1="accent1" accent2="accent2" accent3="accent3" accent4="accent4" accent5="accent5" accent6="accent6" hlink="hlink" folHlink="folHlink"/>
   <p:notesStyle>
@@ -328,18 +318,12 @@
           <a:p>
             <a:fld id="{F7021451-1387-4CA6-816F-3879F97B5CBC}" type="slidenum">
               <a:rPr lang="en-US"/>
-              <a:t>1</a:t>
             </a:fld>
             <a:endParaRPr lang="en-US"/>
           </a:p>
         </p:txBody>
       </p:sp>
     </p:spTree>
-    <p:extLst>
-      <p:ext uri="{BB962C8B-B14F-4D97-AF65-F5344CB8AC3E}">
-        <p14:creationId xmlns:p14="http://schemas.microsoft.com/office/powerpoint/2010/main" val="1024086991"/>
-      </p:ext>
-    </p:extLst>
   </p:cSld>
   <p:clrMapOvr>
     <a:masterClrMapping/>
@@ -412,18 +396,12 @@
           <a:p>
             <a:fld id="{F7021451-1387-4CA6-816F-3879F97B5CBC}" type="slidenum">
               <a:rPr lang="en-US"/>
-              <a:t>10</a:t>
             </a:fld>
             <a:endParaRPr lang="en-US"/>
           </a:p>
         </p:txBody>
       </p:sp>
     </p:spTree>
-    <p:extLst>
-      <p:ext uri="{BB962C8B-B14F-4D97-AF65-F5344CB8AC3E}">
-        <p14:creationId xmlns:p14="http://schemas.microsoft.com/office/powerpoint/2010/main" val="1024086991"/>
-      </p:ext>
-    </p:extLst>
   </p:cSld>
   <p:clrMapOvr>
     <a:masterClrMapping/>
@@ -496,18 +474,12 @@
           <a:p>
             <a:fld id="{F7021451-1387-4CA6-816F-3879F97B5CBC}" type="slidenum">
               <a:rPr lang="en-US"/>
-              <a:t>11</a:t>
             </a:fld>
             <a:endParaRPr lang="en-US"/>
           </a:p>
         </p:txBody>
       </p:sp>
     </p:spTree>
-    <p:extLst>
-      <p:ext uri="{BB962C8B-B14F-4D97-AF65-F5344CB8AC3E}">
-        <p14:creationId xmlns:p14="http://schemas.microsoft.com/office/powerpoint/2010/main" val="1024086991"/>
-      </p:ext>
-    </p:extLst>
   </p:cSld>
   <p:clrMapOvr>
     <a:masterClrMapping/>
@@ -580,18 +552,12 @@
           <a:p>
             <a:fld id="{F7021451-1387-4CA6-816F-3879F97B5CBC}" type="slidenum">
               <a:rPr lang="en-US"/>
-              <a:t>12</a:t>
             </a:fld>
             <a:endParaRPr lang="en-US"/>
           </a:p>
         </p:txBody>
       </p:sp>
     </p:spTree>
-    <p:extLst>
-      <p:ext uri="{BB962C8B-B14F-4D97-AF65-F5344CB8AC3E}">
-        <p14:creationId xmlns:p14="http://schemas.microsoft.com/office/powerpoint/2010/main" val="1024086991"/>
-      </p:ext>
-    </p:extLst>
   </p:cSld>
   <p:clrMapOvr>
     <a:masterClrMapping/>
@@ -664,18 +630,12 @@
           <a:p>
             <a:fld id="{F7021451-1387-4CA6-816F-3879F97B5CBC}" type="slidenum">
               <a:rPr lang="en-US"/>
-              <a:t>13</a:t>
             </a:fld>
             <a:endParaRPr lang="en-US"/>
           </a:p>
         </p:txBody>
       </p:sp>
     </p:spTree>
-    <p:extLst>
-      <p:ext uri="{BB962C8B-B14F-4D97-AF65-F5344CB8AC3E}">
-        <p14:creationId xmlns:p14="http://schemas.microsoft.com/office/powerpoint/2010/main" val="1024086991"/>
-      </p:ext>
-    </p:extLst>
   </p:cSld>
   <p:clrMapOvr>
     <a:masterClrMapping/>
@@ -748,18 +708,12 @@
           <a:p>
             <a:fld id="{F7021451-1387-4CA6-816F-3879F97B5CBC}" type="slidenum">
               <a:rPr lang="en-US"/>
-              <a:t>14</a:t>
             </a:fld>
             <a:endParaRPr lang="en-US"/>
           </a:p>
         </p:txBody>
       </p:sp>
     </p:spTree>
-    <p:extLst>
-      <p:ext uri="{BB962C8B-B14F-4D97-AF65-F5344CB8AC3E}">
-        <p14:creationId xmlns:p14="http://schemas.microsoft.com/office/powerpoint/2010/main" val="1024086991"/>
-      </p:ext>
-    </p:extLst>
   </p:cSld>
   <p:clrMapOvr>
     <a:masterClrMapping/>
@@ -832,18 +786,12 @@
           <a:p>
             <a:fld id="{F7021451-1387-4CA6-816F-3879F97B5CBC}" type="slidenum">
               <a:rPr lang="en-US"/>
-              <a:t>15</a:t>
             </a:fld>
             <a:endParaRPr lang="en-US"/>
           </a:p>
         </p:txBody>
       </p:sp>
     </p:spTree>
-    <p:extLst>
-      <p:ext uri="{BB962C8B-B14F-4D97-AF65-F5344CB8AC3E}">
-        <p14:creationId xmlns:p14="http://schemas.microsoft.com/office/powerpoint/2010/main" val="1024086991"/>
-      </p:ext>
-    </p:extLst>
   </p:cSld>
   <p:clrMapOvr>
     <a:masterClrMapping/>
@@ -916,18 +864,12 @@
           <a:p>
             <a:fld id="{F7021451-1387-4CA6-816F-3879F97B5CBC}" type="slidenum">
               <a:rPr lang="en-US"/>
-              <a:t>16</a:t>
             </a:fld>
             <a:endParaRPr lang="en-US"/>
           </a:p>
         </p:txBody>
       </p:sp>
     </p:spTree>
-    <p:extLst>
-      <p:ext uri="{BB962C8B-B14F-4D97-AF65-F5344CB8AC3E}">
-        <p14:creationId xmlns:p14="http://schemas.microsoft.com/office/powerpoint/2010/main" val="1024086991"/>
-      </p:ext>
-    </p:extLst>
   </p:cSld>
   <p:clrMapOvr>
     <a:masterClrMapping/>
@@ -1000,18 +942,12 @@
           <a:p>
             <a:fld id="{F7021451-1387-4CA6-816F-3879F97B5CBC}" type="slidenum">
               <a:rPr lang="en-US"/>
-              <a:t>17</a:t>
             </a:fld>
             <a:endParaRPr lang="en-US"/>
           </a:p>
         </p:txBody>
       </p:sp>
     </p:spTree>
-    <p:extLst>
-      <p:ext uri="{BB962C8B-B14F-4D97-AF65-F5344CB8AC3E}">
-        <p14:creationId xmlns:p14="http://schemas.microsoft.com/office/powerpoint/2010/main" val="1024086991"/>
-      </p:ext>
-    </p:extLst>
   </p:cSld>
   <p:clrMapOvr>
     <a:masterClrMapping/>
@@ -1084,18 +1020,12 @@
           <a:p>
             <a:fld id="{F7021451-1387-4CA6-816F-3879F97B5CBC}" type="slidenum">
               <a:rPr lang="en-US"/>
-              <a:t>18</a:t>
             </a:fld>
             <a:endParaRPr lang="en-US"/>
           </a:p>
         </p:txBody>
       </p:sp>
     </p:spTree>
-    <p:extLst>
-      <p:ext uri="{BB962C8B-B14F-4D97-AF65-F5344CB8AC3E}">
-        <p14:creationId xmlns:p14="http://schemas.microsoft.com/office/powerpoint/2010/main" val="1024086991"/>
-      </p:ext>
-    </p:extLst>
   </p:cSld>
   <p:clrMapOvr>
     <a:masterClrMapping/>
@@ -1168,18 +1098,12 @@
           <a:p>
             <a:fld id="{F7021451-1387-4CA6-816F-3879F97B5CBC}" type="slidenum">
               <a:rPr lang="en-US"/>
-              <a:t>19</a:t>
             </a:fld>
             <a:endParaRPr lang="en-US"/>
           </a:p>
         </p:txBody>
       </p:sp>
     </p:spTree>
-    <p:extLst>
-      <p:ext uri="{BB962C8B-B14F-4D97-AF65-F5344CB8AC3E}">
-        <p14:creationId xmlns:p14="http://schemas.microsoft.com/office/powerpoint/2010/main" val="1024086991"/>
-      </p:ext>
-    </p:extLst>
   </p:cSld>
   <p:clrMapOvr>
     <a:masterClrMapping/>
@@ -1252,18 +1176,12 @@
           <a:p>
             <a:fld id="{F7021451-1387-4CA6-816F-3879F97B5CBC}" type="slidenum">
               <a:rPr lang="en-US"/>
-              <a:t>2</a:t>
             </a:fld>
             <a:endParaRPr lang="en-US"/>
           </a:p>
         </p:txBody>
       </p:sp>
     </p:spTree>
-    <p:extLst>
-      <p:ext uri="{BB962C8B-B14F-4D97-AF65-F5344CB8AC3E}">
-        <p14:creationId xmlns:p14="http://schemas.microsoft.com/office/powerpoint/2010/main" val="1024086991"/>
-      </p:ext>
-    </p:extLst>
   </p:cSld>
   <p:clrMapOvr>
     <a:masterClrMapping/>
@@ -1336,18 +1254,12 @@
           <a:p>
             <a:fld id="{F7021451-1387-4CA6-816F-3879F97B5CBC}" type="slidenum">
               <a:rPr lang="en-US"/>
-              <a:t>20</a:t>
             </a:fld>
             <a:endParaRPr lang="en-US"/>
           </a:p>
         </p:txBody>
       </p:sp>
     </p:spTree>
-    <p:extLst>
-      <p:ext uri="{BB962C8B-B14F-4D97-AF65-F5344CB8AC3E}">
-        <p14:creationId xmlns:p14="http://schemas.microsoft.com/office/powerpoint/2010/main" val="1024086991"/>
-      </p:ext>
-    </p:extLst>
   </p:cSld>
   <p:clrMapOvr>
     <a:masterClrMapping/>
@@ -1420,18 +1332,12 @@
           <a:p>
             <a:fld id="{F7021451-1387-4CA6-816F-3879F97B5CBC}" type="slidenum">
               <a:rPr lang="en-US"/>
-              <a:t>21</a:t>
             </a:fld>
             <a:endParaRPr lang="en-US"/>
           </a:p>
         </p:txBody>
       </p:sp>
     </p:spTree>
-    <p:extLst>
-      <p:ext uri="{BB962C8B-B14F-4D97-AF65-F5344CB8AC3E}">
-        <p14:creationId xmlns:p14="http://schemas.microsoft.com/office/powerpoint/2010/main" val="1024086991"/>
-      </p:ext>
-    </p:extLst>
   </p:cSld>
   <p:clrMapOvr>
     <a:masterClrMapping/>
@@ -1504,18 +1410,12 @@
           <a:p>
             <a:fld id="{F7021451-1387-4CA6-816F-3879F97B5CBC}" type="slidenum">
               <a:rPr lang="en-US"/>
-              <a:t>22</a:t>
             </a:fld>
             <a:endParaRPr lang="en-US"/>
           </a:p>
         </p:txBody>
       </p:sp>
     </p:spTree>
-    <p:extLst>
-      <p:ext uri="{BB962C8B-B14F-4D97-AF65-F5344CB8AC3E}">
-        <p14:creationId xmlns:p14="http://schemas.microsoft.com/office/powerpoint/2010/main" val="1024086991"/>
-      </p:ext>
-    </p:extLst>
   </p:cSld>
   <p:clrMapOvr>
     <a:masterClrMapping/>
@@ -1588,18 +1488,12 @@
           <a:p>
             <a:fld id="{F7021451-1387-4CA6-816F-3879F97B5CBC}" type="slidenum">
               <a:rPr lang="en-US"/>
-              <a:t>23</a:t>
             </a:fld>
             <a:endParaRPr lang="en-US"/>
           </a:p>
         </p:txBody>
       </p:sp>
     </p:spTree>
-    <p:extLst>
-      <p:ext uri="{BB962C8B-B14F-4D97-AF65-F5344CB8AC3E}">
-        <p14:creationId xmlns:p14="http://schemas.microsoft.com/office/powerpoint/2010/main" val="1024086991"/>
-      </p:ext>
-    </p:extLst>
   </p:cSld>
   <p:clrMapOvr>
     <a:masterClrMapping/>
@@ -1672,18 +1566,12 @@
           <a:p>
             <a:fld id="{F7021451-1387-4CA6-816F-3879F97B5CBC}" type="slidenum">
               <a:rPr lang="en-US"/>
-              <a:t>24</a:t>
             </a:fld>
             <a:endParaRPr lang="en-US"/>
           </a:p>
         </p:txBody>
       </p:sp>
     </p:spTree>
-    <p:extLst>
-      <p:ext uri="{BB962C8B-B14F-4D97-AF65-F5344CB8AC3E}">
-        <p14:creationId xmlns:p14="http://schemas.microsoft.com/office/powerpoint/2010/main" val="1024086991"/>
-      </p:ext>
-    </p:extLst>
   </p:cSld>
   <p:clrMapOvr>
     <a:masterClrMapping/>
@@ -1756,18 +1644,12 @@
           <a:p>
             <a:fld id="{F7021451-1387-4CA6-816F-3879F97B5CBC}" type="slidenum">
               <a:rPr lang="en-US"/>
-              <a:t>25</a:t>
             </a:fld>
             <a:endParaRPr lang="en-US"/>
           </a:p>
         </p:txBody>
       </p:sp>
     </p:spTree>
-    <p:extLst>
-      <p:ext uri="{BB962C8B-B14F-4D97-AF65-F5344CB8AC3E}">
-        <p14:creationId xmlns:p14="http://schemas.microsoft.com/office/powerpoint/2010/main" val="1024086991"/>
-      </p:ext>
-    </p:extLst>
   </p:cSld>
   <p:clrMapOvr>
     <a:masterClrMapping/>
@@ -1840,18 +1722,12 @@
           <a:p>
             <a:fld id="{F7021451-1387-4CA6-816F-3879F97B5CBC}" type="slidenum">
               <a:rPr lang="en-US"/>
-              <a:t>26</a:t>
             </a:fld>
             <a:endParaRPr lang="en-US"/>
           </a:p>
         </p:txBody>
       </p:sp>
     </p:spTree>
-    <p:extLst>
-      <p:ext uri="{BB962C8B-B14F-4D97-AF65-F5344CB8AC3E}">
-        <p14:creationId xmlns:p14="http://schemas.microsoft.com/office/powerpoint/2010/main" val="1024086991"/>
-      </p:ext>
-    </p:extLst>
   </p:cSld>
   <p:clrMapOvr>
     <a:masterClrMapping/>
@@ -1924,18 +1800,12 @@
           <a:p>
             <a:fld id="{F7021451-1387-4CA6-816F-3879F97B5CBC}" type="slidenum">
               <a:rPr lang="en-US"/>
-              <a:t>27</a:t>
             </a:fld>
             <a:endParaRPr lang="en-US"/>
           </a:p>
         </p:txBody>
       </p:sp>
     </p:spTree>
-    <p:extLst>
-      <p:ext uri="{BB962C8B-B14F-4D97-AF65-F5344CB8AC3E}">
-        <p14:creationId xmlns:p14="http://schemas.microsoft.com/office/powerpoint/2010/main" val="1024086991"/>
-      </p:ext>
-    </p:extLst>
   </p:cSld>
   <p:clrMapOvr>
     <a:masterClrMapping/>
@@ -2008,18 +1878,12 @@
           <a:p>
             <a:fld id="{F7021451-1387-4CA6-816F-3879F97B5CBC}" type="slidenum">
               <a:rPr lang="en-US"/>
-              <a:t>3</a:t>
             </a:fld>
             <a:endParaRPr lang="en-US"/>
           </a:p>
         </p:txBody>
       </p:sp>
     </p:spTree>
-    <p:extLst>
-      <p:ext uri="{BB962C8B-B14F-4D97-AF65-F5344CB8AC3E}">
-        <p14:creationId xmlns:p14="http://schemas.microsoft.com/office/powerpoint/2010/main" val="1024086991"/>
-      </p:ext>
-    </p:extLst>
   </p:cSld>
   <p:clrMapOvr>
     <a:masterClrMapping/>
@@ -2092,18 +1956,12 @@
           <a:p>
             <a:fld id="{F7021451-1387-4CA6-816F-3879F97B5CBC}" type="slidenum">
               <a:rPr lang="en-US"/>
-              <a:t>4</a:t>
             </a:fld>
             <a:endParaRPr lang="en-US"/>
           </a:p>
         </p:txBody>
       </p:sp>
     </p:spTree>
-    <p:extLst>
-      <p:ext uri="{BB962C8B-B14F-4D97-AF65-F5344CB8AC3E}">
-        <p14:creationId xmlns:p14="http://schemas.microsoft.com/office/powerpoint/2010/main" val="1024086991"/>
-      </p:ext>
-    </p:extLst>
   </p:cSld>
   <p:clrMapOvr>
     <a:masterClrMapping/>
@@ -2176,18 +2034,12 @@
           <a:p>
             <a:fld id="{F7021451-1387-4CA6-816F-3879F97B5CBC}" type="slidenum">
               <a:rPr lang="en-US"/>
-              <a:t>5</a:t>
             </a:fld>
             <a:endParaRPr lang="en-US"/>
           </a:p>
         </p:txBody>
       </p:sp>
     </p:spTree>
-    <p:extLst>
-      <p:ext uri="{BB962C8B-B14F-4D97-AF65-F5344CB8AC3E}">
-        <p14:creationId xmlns:p14="http://schemas.microsoft.com/office/powerpoint/2010/main" val="1024086991"/>
-      </p:ext>
-    </p:extLst>
   </p:cSld>
   <p:clrMapOvr>
     <a:masterClrMapping/>
@@ -2260,18 +2112,12 @@
           <a:p>
             <a:fld id="{F7021451-1387-4CA6-816F-3879F97B5CBC}" type="slidenum">
               <a:rPr lang="en-US"/>
-              <a:t>6</a:t>
             </a:fld>
             <a:endParaRPr lang="en-US"/>
           </a:p>
         </p:txBody>
       </p:sp>
     </p:spTree>
-    <p:extLst>
-      <p:ext uri="{BB962C8B-B14F-4D97-AF65-F5344CB8AC3E}">
-        <p14:creationId xmlns:p14="http://schemas.microsoft.com/office/powerpoint/2010/main" val="1024086991"/>
-      </p:ext>
-    </p:extLst>
   </p:cSld>
   <p:clrMapOvr>
     <a:masterClrMapping/>
@@ -2344,18 +2190,12 @@
           <a:p>
             <a:fld id="{F7021451-1387-4CA6-816F-3879F97B5CBC}" type="slidenum">
               <a:rPr lang="en-US"/>
-              <a:t>7</a:t>
             </a:fld>
             <a:endParaRPr lang="en-US"/>
           </a:p>
         </p:txBody>
       </p:sp>
     </p:spTree>
-    <p:extLst>
-      <p:ext uri="{BB962C8B-B14F-4D97-AF65-F5344CB8AC3E}">
-        <p14:creationId xmlns:p14="http://schemas.microsoft.com/office/powerpoint/2010/main" val="1024086991"/>
-      </p:ext>
-    </p:extLst>
   </p:cSld>
   <p:clrMapOvr>
     <a:masterClrMapping/>
@@ -2428,18 +2268,12 @@
           <a:p>
             <a:fld id="{F7021451-1387-4CA6-816F-3879F97B5CBC}" type="slidenum">
               <a:rPr lang="en-US"/>
-              <a:t>8</a:t>
             </a:fld>
             <a:endParaRPr lang="en-US"/>
           </a:p>
         </p:txBody>
       </p:sp>
     </p:spTree>
-    <p:extLst>
-      <p:ext uri="{BB962C8B-B14F-4D97-AF65-F5344CB8AC3E}">
-        <p14:creationId xmlns:p14="http://schemas.microsoft.com/office/powerpoint/2010/main" val="1024086991"/>
-      </p:ext>
-    </p:extLst>
   </p:cSld>
   <p:clrMapOvr>
     <a:masterClrMapping/>
@@ -2512,18 +2346,12 @@
           <a:p>
             <a:fld id="{F7021451-1387-4CA6-816F-3879F97B5CBC}" type="slidenum">
               <a:rPr lang="en-US"/>
-              <a:t>9</a:t>
             </a:fld>
             <a:endParaRPr lang="en-US"/>
           </a:p>
         </p:txBody>
       </p:sp>
     </p:spTree>
-    <p:extLst>
-      <p:ext uri="{BB962C8B-B14F-4D97-AF65-F5344CB8AC3E}">
-        <p14:creationId xmlns:p14="http://schemas.microsoft.com/office/powerpoint/2010/main" val="1024086991"/>
-      </p:ext>
-    </p:extLst>
   </p:cSld>
   <p:clrMapOvr>
     <a:masterClrMapping/>
@@ -2612,7 +2440,7 @@
         <a:spcBef>
           <a:spcPct val="20000"/>
         </a:spcBef>
-        <a:buFont typeface="Arial" pitchFamily="34" charset="0"/>
+        <a:buFont typeface="Arial" panose="020B0604020202020204" pitchFamily="34" charset="0"/>
         <a:buChar char="•"/>
         <a:defRPr sz="3200" kern="1200">
           <a:solidFill>
@@ -2627,7 +2455,7 @@
         <a:spcBef>
           <a:spcPct val="20000"/>
         </a:spcBef>
-        <a:buFont typeface="Arial" pitchFamily="34" charset="0"/>
+        <a:buFont typeface="Arial" panose="020B0604020202020204" pitchFamily="34" charset="0"/>
         <a:buChar char="–"/>
         <a:defRPr sz="2800" kern="1200">
           <a:solidFill>
@@ -2642,7 +2470,7 @@
         <a:spcBef>
           <a:spcPct val="20000"/>
         </a:spcBef>
-        <a:buFont typeface="Arial" pitchFamily="34" charset="0"/>
+        <a:buFont typeface="Arial" panose="020B0604020202020204" pitchFamily="34" charset="0"/>
         <a:buChar char="•"/>
         <a:defRPr sz="2400" kern="1200">
           <a:solidFill>
@@ -2657,7 +2485,7 @@
         <a:spcBef>
           <a:spcPct val="20000"/>
         </a:spcBef>
-        <a:buFont typeface="Arial" pitchFamily="34" charset="0"/>
+        <a:buFont typeface="Arial" panose="020B0604020202020204" pitchFamily="34" charset="0"/>
         <a:buChar char="–"/>
         <a:defRPr sz="2000" kern="1200">
           <a:solidFill>
@@ -2672,7 +2500,7 @@
         <a:spcBef>
           <a:spcPct val="20000"/>
         </a:spcBef>
-        <a:buFont typeface="Arial" pitchFamily="34" charset="0"/>
+        <a:buFont typeface="Arial" panose="020B0604020202020204" pitchFamily="34" charset="0"/>
         <a:buChar char="»"/>
         <a:defRPr sz="2000" kern="1200">
           <a:solidFill>
@@ -2687,7 +2515,7 @@
         <a:spcBef>
           <a:spcPct val="20000"/>
         </a:spcBef>
-        <a:buFont typeface="Arial" pitchFamily="34" charset="0"/>
+        <a:buFont typeface="Arial" panose="020B0604020202020204" pitchFamily="34" charset="0"/>
         <a:buChar char="•"/>
         <a:defRPr sz="2000" kern="1200">
           <a:solidFill>
@@ -2702,7 +2530,7 @@
         <a:spcBef>
           <a:spcPct val="20000"/>
         </a:spcBef>
-        <a:buFont typeface="Arial" pitchFamily="34" charset="0"/>
+        <a:buFont typeface="Arial" panose="020B0604020202020204" pitchFamily="34" charset="0"/>
         <a:buChar char="•"/>
         <a:defRPr sz="2000" kern="1200">
           <a:solidFill>
@@ -2717,7 +2545,7 @@
         <a:spcBef>
           <a:spcPct val="20000"/>
         </a:spcBef>
-        <a:buFont typeface="Arial" pitchFamily="34" charset="0"/>
+        <a:buFont typeface="Arial" panose="020B0604020202020204" pitchFamily="34" charset="0"/>
         <a:buChar char="•"/>
         <a:defRPr sz="2000" kern="1200">
           <a:solidFill>
@@ -2732,7 +2560,7 @@
         <a:spcBef>
           <a:spcPct val="20000"/>
         </a:spcBef>
-        <a:buFont typeface="Arial" pitchFamily="34" charset="0"/>
+        <a:buFont typeface="Arial" panose="020B0604020202020204" pitchFamily="34" charset="0"/>
         <a:buChar char="•"/>
         <a:defRPr sz="2000" kern="1200">
           <a:solidFill>
@@ -2845,7 +2673,7 @@
 
 <file path=ppt/slides/slide1.xml><?xml version="1.0" encoding="utf-8"?>
 <p:sld xmlns:a="http://schemas.openxmlformats.org/drawingml/2006/main" xmlns:r="http://schemas.openxmlformats.org/officeDocument/2006/relationships" xmlns:p="http://schemas.openxmlformats.org/presentationml/2006/main">
-  <p:cSld name="Slide 1">
+  <p:cSld>
     <p:bg>
       <p:bgPr>
         <a:solidFill>
@@ -2883,7 +2711,6 @@
             <a:avLst/>
           </a:prstGeom>
           <a:noFill/>
-          <a:ln/>
         </p:spPr>
         <p:txBody>
           <a:bodyPr wrap="square" lIns="0" tIns="0" rIns="0" bIns="0" rtlCol="0" anchor="ctr"/>
@@ -2937,9 +2764,11 @@
           <p:nvPr/>
         </p:nvPicPr>
         <p:blipFill>
-          <a:blip r:embed="rId3"/>
+          <a:blip r:embed="rId1"/>
           <a:srcRect t="4635" b="3253"/>
-          <a:stretch/>
+          <a:stretch>
+            <a:fillRect/>
+          </a:stretch>
         </p:blipFill>
         <p:spPr>
           <a:xfrm>
@@ -2960,9 +2789,11 @@
           <p:nvPr/>
         </p:nvPicPr>
         <p:blipFill>
-          <a:blip r:embed="rId4"/>
+          <a:blip r:embed="rId2"/>
           <a:srcRect/>
-          <a:stretch/>
+          <a:stretch>
+            <a:fillRect/>
+          </a:stretch>
         </p:blipFill>
         <p:spPr>
           <a:xfrm>
@@ -2984,7 +2815,7 @@
 
 <file path=ppt/slides/slide10.xml><?xml version="1.0" encoding="utf-8"?>
 <p:sld xmlns:a="http://schemas.openxmlformats.org/drawingml/2006/main" xmlns:r="http://schemas.openxmlformats.org/officeDocument/2006/relationships" xmlns:p="http://schemas.openxmlformats.org/presentationml/2006/main">
-  <p:cSld name="Slide 10">
+  <p:cSld>
     <p:bg>
       <p:bgPr>
         <a:solidFill>
@@ -3026,7 +2857,6 @@
           <a:solidFill>
             <a:srgbClr val="D3E2F2"/>
           </a:solidFill>
-          <a:ln/>
         </p:spPr>
         <p:txBody>
           <a:bodyPr wrap="square" lIns="508085" tIns="607335" rIns="508085" bIns="607335" rtlCol="0" anchor="ctr"/>
@@ -3050,9 +2880,11 @@
           <p:nvPr/>
         </p:nvPicPr>
         <p:blipFill>
-          <a:blip r:embed="rId3"/>
+          <a:blip r:embed="rId1"/>
           <a:srcRect/>
-          <a:stretch/>
+          <a:stretch>
+            <a:fillRect/>
+          </a:stretch>
         </p:blipFill>
         <p:spPr>
           <a:xfrm>
@@ -3074,7 +2906,7 @@
 
 <file path=ppt/slides/slide11.xml><?xml version="1.0" encoding="utf-8"?>
 <p:sld xmlns:a="http://schemas.openxmlformats.org/drawingml/2006/main" xmlns:r="http://schemas.openxmlformats.org/officeDocument/2006/relationships" xmlns:p="http://schemas.openxmlformats.org/presentationml/2006/main">
-  <p:cSld name="Slide 11">
+  <p:cSld>
     <p:bg>
       <p:bgPr>
         <a:solidFill>
@@ -3116,7 +2948,6 @@
           <a:solidFill>
             <a:srgbClr val="D3E2F2"/>
           </a:solidFill>
-          <a:ln/>
         </p:spPr>
         <p:txBody>
           <a:bodyPr wrap="square" lIns="508085" tIns="607335" rIns="508085" bIns="607335" rtlCol="0" anchor="ctr"/>
@@ -3140,9 +2971,11 @@
           <p:nvPr/>
         </p:nvPicPr>
         <p:blipFill>
-          <a:blip r:embed="rId3"/>
+          <a:blip r:embed="rId1"/>
           <a:srcRect/>
-          <a:stretch/>
+          <a:stretch>
+            <a:fillRect/>
+          </a:stretch>
         </p:blipFill>
         <p:spPr>
           <a:xfrm>
@@ -3164,7 +2997,7 @@
 
 <file path=ppt/slides/slide12.xml><?xml version="1.0" encoding="utf-8"?>
 <p:sld xmlns:a="http://schemas.openxmlformats.org/drawingml/2006/main" xmlns:r="http://schemas.openxmlformats.org/officeDocument/2006/relationships" xmlns:p="http://schemas.openxmlformats.org/presentationml/2006/main">
-  <p:cSld name="Slide 12">
+  <p:cSld>
     <p:bg>
       <p:bgPr>
         <a:solidFill>
@@ -3206,7 +3039,6 @@
           <a:solidFill>
             <a:srgbClr val="D3E2F2"/>
           </a:solidFill>
-          <a:ln/>
         </p:spPr>
         <p:txBody>
           <a:bodyPr wrap="square" lIns="508085" tIns="607335" rIns="508085" bIns="607335" rtlCol="0" anchor="ctr"/>
@@ -3230,9 +3062,11 @@
           <p:nvPr/>
         </p:nvPicPr>
         <p:blipFill>
-          <a:blip r:embed="rId3"/>
+          <a:blip r:embed="rId1"/>
           <a:srcRect b="57263"/>
-          <a:stretch/>
+          <a:stretch>
+            <a:fillRect/>
+          </a:stretch>
         </p:blipFill>
         <p:spPr>
           <a:xfrm>
@@ -3254,7 +3088,7 @@
 
 <file path=ppt/slides/slide13.xml><?xml version="1.0" encoding="utf-8"?>
 <p:sld xmlns:a="http://schemas.openxmlformats.org/drawingml/2006/main" xmlns:r="http://schemas.openxmlformats.org/officeDocument/2006/relationships" xmlns:p="http://schemas.openxmlformats.org/presentationml/2006/main">
-  <p:cSld name="Slide 13">
+  <p:cSld>
     <p:bg>
       <p:bgPr>
         <a:solidFill>
@@ -3296,7 +3130,6 @@
           <a:solidFill>
             <a:srgbClr val="D3E2F2"/>
           </a:solidFill>
-          <a:ln/>
         </p:spPr>
         <p:txBody>
           <a:bodyPr wrap="square" lIns="508085" tIns="607335" rIns="508085" bIns="607335" rtlCol="0" anchor="ctr"/>
@@ -3320,9 +3153,11 @@
           <p:nvPr/>
         </p:nvPicPr>
         <p:blipFill>
-          <a:blip r:embed="rId3"/>
+          <a:blip r:embed="rId1"/>
           <a:srcRect t="42843" b="14419"/>
-          <a:stretch/>
+          <a:stretch>
+            <a:fillRect/>
+          </a:stretch>
         </p:blipFill>
         <p:spPr>
           <a:xfrm>
@@ -3344,7 +3179,7 @@
 
 <file path=ppt/slides/slide14.xml><?xml version="1.0" encoding="utf-8"?>
 <p:sld xmlns:a="http://schemas.openxmlformats.org/drawingml/2006/main" xmlns:r="http://schemas.openxmlformats.org/officeDocument/2006/relationships" xmlns:p="http://schemas.openxmlformats.org/presentationml/2006/main">
-  <p:cSld name="Slide 14">
+  <p:cSld>
     <p:bg>
       <p:bgPr>
         <a:solidFill>
@@ -3386,7 +3221,6 @@
           <a:solidFill>
             <a:srgbClr val="D3E2F2"/>
           </a:solidFill>
-          <a:ln/>
         </p:spPr>
         <p:txBody>
           <a:bodyPr wrap="square" lIns="508085" tIns="607335" rIns="508085" bIns="607335" rtlCol="0" anchor="ctr"/>
@@ -3410,9 +3244,11 @@
           <p:nvPr/>
         </p:nvPicPr>
         <p:blipFill>
-          <a:blip r:embed="rId3"/>
+          <a:blip r:embed="rId1"/>
           <a:srcRect/>
-          <a:stretch/>
+          <a:stretch>
+            <a:fillRect/>
+          </a:stretch>
         </p:blipFill>
         <p:spPr>
           <a:xfrm>
@@ -3434,7 +3270,7 @@
 
 <file path=ppt/slides/slide15.xml><?xml version="1.0" encoding="utf-8"?>
 <p:sld xmlns:a="http://schemas.openxmlformats.org/drawingml/2006/main" xmlns:r="http://schemas.openxmlformats.org/officeDocument/2006/relationships" xmlns:p="http://schemas.openxmlformats.org/presentationml/2006/main">
-  <p:cSld name="Slide 15">
+  <p:cSld>
     <p:bg>
       <p:bgPr>
         <a:solidFill>
@@ -3476,7 +3312,6 @@
           <a:solidFill>
             <a:srgbClr val="D3E2F2"/>
           </a:solidFill>
-          <a:ln/>
         </p:spPr>
         <p:txBody>
           <a:bodyPr wrap="square" lIns="508085" tIns="607335" rIns="508085" bIns="607335" rtlCol="0" anchor="ctr"/>
@@ -3500,9 +3335,11 @@
           <p:nvPr/>
         </p:nvPicPr>
         <p:blipFill>
-          <a:blip r:embed="rId3"/>
+          <a:blip r:embed="rId1"/>
           <a:srcRect/>
-          <a:stretch/>
+          <a:stretch>
+            <a:fillRect/>
+          </a:stretch>
         </p:blipFill>
         <p:spPr>
           <a:xfrm>
@@ -3524,7 +3361,7 @@
 
 <file path=ppt/slides/slide16.xml><?xml version="1.0" encoding="utf-8"?>
 <p:sld xmlns:a="http://schemas.openxmlformats.org/drawingml/2006/main" xmlns:r="http://schemas.openxmlformats.org/officeDocument/2006/relationships" xmlns:p="http://schemas.openxmlformats.org/presentationml/2006/main">
-  <p:cSld name="Slide 16">
+  <p:cSld>
     <p:bg>
       <p:bgPr>
         <a:solidFill>
@@ -3566,7 +3403,6 @@
           <a:solidFill>
             <a:srgbClr val="D3E2F2"/>
           </a:solidFill>
-          <a:ln/>
         </p:spPr>
         <p:txBody>
           <a:bodyPr/>
@@ -3585,15 +3421,11 @@
           <p:nvPr/>
         </p:nvPicPr>
         <p:blipFill>
-          <a:blip r:embed="rId3">
-            <a:extLst>
-              <a:ext uri="{96DAC541-7B7A-43D3-8B79-37D633B846F1}">
-                <asvg:svgBlip xmlns:asvg="http://schemas.microsoft.com/office/drawing/2016/SVG/main" r:embed="rId4"/>
-              </a:ext>
-            </a:extLst>
-          </a:blip>
+          <a:blip r:embed="rId1"/>
           <a:srcRect/>
-          <a:stretch/>
+          <a:stretch>
+            <a:fillRect/>
+          </a:stretch>
         </p:blipFill>
         <p:spPr>
           <a:xfrm>
@@ -3614,15 +3446,11 @@
           <p:nvPr/>
         </p:nvPicPr>
         <p:blipFill>
-          <a:blip r:embed="rId5">
-            <a:extLst>
-              <a:ext uri="{96DAC541-7B7A-43D3-8B79-37D633B846F1}">
-                <asvg:svgBlip xmlns:asvg="http://schemas.microsoft.com/office/drawing/2016/SVG/main" r:embed="rId6"/>
-              </a:ext>
-            </a:extLst>
-          </a:blip>
+          <a:blip r:embed="rId2"/>
           <a:srcRect/>
-          <a:stretch/>
+          <a:stretch>
+            <a:fillRect/>
+          </a:stretch>
         </p:blipFill>
         <p:spPr>
           <a:xfrm>
@@ -3649,7 +3477,6 @@
             <a:avLst/>
           </a:prstGeom>
           <a:noFill/>
-          <a:ln/>
         </p:spPr>
         <p:txBody>
           <a:bodyPr wrap="square" lIns="0" tIns="0" rIns="0" bIns="0" rtlCol="0" anchor="b"/>
@@ -3734,7 +3561,6 @@
             <a:avLst/>
           </a:prstGeom>
           <a:noFill/>
-          <a:ln/>
         </p:spPr>
         <p:txBody>
           <a:bodyPr wrap="square" lIns="0" tIns="0" rIns="0" bIns="0" rtlCol="0" anchor="t"/>
@@ -3770,7 +3596,7 @@
 
 <file path=ppt/slides/slide17.xml><?xml version="1.0" encoding="utf-8"?>
 <p:sld xmlns:a="http://schemas.openxmlformats.org/drawingml/2006/main" xmlns:r="http://schemas.openxmlformats.org/officeDocument/2006/relationships" xmlns:p="http://schemas.openxmlformats.org/presentationml/2006/main">
-  <p:cSld name="Slide 17">
+  <p:cSld>
     <p:bg>
       <p:bgPr>
         <a:solidFill>
@@ -3812,7 +3638,6 @@
           <a:solidFill>
             <a:srgbClr val="D3E2F2"/>
           </a:solidFill>
-          <a:ln/>
         </p:spPr>
         <p:txBody>
           <a:bodyPr wrap="square" lIns="508085" tIns="607335" rIns="508085" bIns="607335" rtlCol="0" anchor="ctr"/>
@@ -3836,9 +3661,11 @@
           <p:nvPr/>
         </p:nvPicPr>
         <p:blipFill>
-          <a:blip r:embed="rId3"/>
+          <a:blip r:embed="rId1"/>
           <a:srcRect/>
-          <a:stretch/>
+          <a:stretch>
+            <a:fillRect/>
+          </a:stretch>
         </p:blipFill>
         <p:spPr>
           <a:xfrm>
@@ -3860,7 +3687,7 @@
 
 <file path=ppt/slides/slide18.xml><?xml version="1.0" encoding="utf-8"?>
 <p:sld xmlns:a="http://schemas.openxmlformats.org/drawingml/2006/main" xmlns:r="http://schemas.openxmlformats.org/officeDocument/2006/relationships" xmlns:p="http://schemas.openxmlformats.org/presentationml/2006/main">
-  <p:cSld name="Slide 18">
+  <p:cSld>
     <p:bg>
       <p:bgPr>
         <a:solidFill>
@@ -3902,7 +3729,6 @@
           <a:solidFill>
             <a:srgbClr val="D3E2F2"/>
           </a:solidFill>
-          <a:ln/>
         </p:spPr>
         <p:txBody>
           <a:bodyPr wrap="square" lIns="508085" tIns="607335" rIns="508085" bIns="607335" rtlCol="0" anchor="ctr"/>
@@ -3926,9 +3752,11 @@
           <p:nvPr/>
         </p:nvPicPr>
         <p:blipFill>
-          <a:blip r:embed="rId3"/>
+          <a:blip r:embed="rId1"/>
           <a:srcRect/>
-          <a:stretch/>
+          <a:stretch>
+            <a:fillRect/>
+          </a:stretch>
         </p:blipFill>
         <p:spPr>
           <a:xfrm>
@@ -3950,7 +3778,7 @@
 
 <file path=ppt/slides/slide19.xml><?xml version="1.0" encoding="utf-8"?>
 <p:sld xmlns:a="http://schemas.openxmlformats.org/drawingml/2006/main" xmlns:r="http://schemas.openxmlformats.org/officeDocument/2006/relationships" xmlns:p="http://schemas.openxmlformats.org/presentationml/2006/main">
-  <p:cSld name="Slide 19">
+  <p:cSld>
     <p:bg>
       <p:bgPr>
         <a:solidFill>
@@ -3992,7 +3820,6 @@
           <a:solidFill>
             <a:srgbClr val="D3E2F2"/>
           </a:solidFill>
-          <a:ln/>
         </p:spPr>
         <p:txBody>
           <a:bodyPr wrap="square" lIns="508085" tIns="607335" rIns="508085" bIns="607335" rtlCol="0" anchor="ctr"/>
@@ -4016,9 +3843,11 @@
           <p:nvPr/>
         </p:nvPicPr>
         <p:blipFill>
-          <a:blip r:embed="rId3"/>
+          <a:blip r:embed="rId1"/>
           <a:srcRect/>
-          <a:stretch/>
+          <a:stretch>
+            <a:fillRect/>
+          </a:stretch>
         </p:blipFill>
         <p:spPr>
           <a:xfrm>
@@ -4040,7 +3869,7 @@
 
 <file path=ppt/slides/slide2.xml><?xml version="1.0" encoding="utf-8"?>
 <p:sld xmlns:a="http://schemas.openxmlformats.org/drawingml/2006/main" xmlns:r="http://schemas.openxmlformats.org/officeDocument/2006/relationships" xmlns:p="http://schemas.openxmlformats.org/presentationml/2006/main">
-  <p:cSld name="Slide 2">
+  <p:cSld>
     <p:bg>
       <p:bgPr>
         <a:solidFill>
@@ -4072,15 +3901,17 @@
           <p:nvPr/>
         </p:nvPicPr>
         <p:blipFill>
-          <a:blip r:embed="rId3">
+          <a:blip r:embed="rId1">
             <a:extLst>
               <a:ext uri="{96DAC541-7B7A-43D3-8B79-37D633B846F1}">
-                <asvg:svgBlip xmlns:asvg="http://schemas.microsoft.com/office/drawing/2016/SVG/main" r:embed="rId4"/>
+                <asvg:svgBlip xmlns:asvg="http://schemas.microsoft.com/office/drawing/2016/SVG/main" r:embed="rId2"/>
               </a:ext>
             </a:extLst>
           </a:blip>
           <a:srcRect t="-96" b="-96"/>
-          <a:stretch/>
+          <a:stretch>
+            <a:fillRect/>
+          </a:stretch>
         </p:blipFill>
         <p:spPr>
           <a:xfrm>
@@ -4107,7 +3938,6 @@
             <a:avLst/>
           </a:prstGeom>
           <a:noFill/>
-          <a:ln/>
         </p:spPr>
         <p:txBody>
           <a:bodyPr wrap="square" lIns="0" tIns="0" rIns="0" bIns="0" rtlCol="0" anchor="t"/>
@@ -4148,7 +3978,6 @@
             <a:avLst/>
           </a:prstGeom>
           <a:noFill/>
-          <a:ln/>
         </p:spPr>
         <p:txBody>
           <a:bodyPr wrap="square" lIns="0" tIns="0" rIns="0" bIns="0" rtlCol="0" anchor="t"/>
@@ -4184,7 +4013,7 @@
 
 <file path=ppt/slides/slide20.xml><?xml version="1.0" encoding="utf-8"?>
 <p:sld xmlns:a="http://schemas.openxmlformats.org/drawingml/2006/main" xmlns:r="http://schemas.openxmlformats.org/officeDocument/2006/relationships" xmlns:p="http://schemas.openxmlformats.org/presentationml/2006/main">
-  <p:cSld name="Slide 20">
+  <p:cSld>
     <p:bg>
       <p:bgPr>
         <a:solidFill>
@@ -4226,7 +4055,6 @@
           <a:solidFill>
             <a:srgbClr val="D3E2F2"/>
           </a:solidFill>
-          <a:ln/>
         </p:spPr>
         <p:txBody>
           <a:bodyPr wrap="square" lIns="508085" tIns="607335" rIns="508085" bIns="607335" rtlCol="0" anchor="ctr"/>
@@ -4250,9 +4078,11 @@
           <p:nvPr/>
         </p:nvPicPr>
         <p:blipFill>
-          <a:blip r:embed="rId3"/>
+          <a:blip r:embed="rId1"/>
           <a:srcRect/>
-          <a:stretch/>
+          <a:stretch>
+            <a:fillRect/>
+          </a:stretch>
         </p:blipFill>
         <p:spPr>
           <a:xfrm>
@@ -4274,7 +4104,7 @@
 
 <file path=ppt/slides/slide21.xml><?xml version="1.0" encoding="utf-8"?>
 <p:sld xmlns:a="http://schemas.openxmlformats.org/drawingml/2006/main" xmlns:r="http://schemas.openxmlformats.org/officeDocument/2006/relationships" xmlns:p="http://schemas.openxmlformats.org/presentationml/2006/main">
-  <p:cSld name="Slide 21">
+  <p:cSld>
     <p:bg>
       <p:bgPr>
         <a:solidFill>
@@ -4316,7 +4146,6 @@
           <a:solidFill>
             <a:srgbClr val="D3E2F2"/>
           </a:solidFill>
-          <a:ln/>
         </p:spPr>
         <p:txBody>
           <a:bodyPr/>
@@ -4335,15 +4164,11 @@
           <p:nvPr/>
         </p:nvPicPr>
         <p:blipFill>
-          <a:blip r:embed="rId3">
-            <a:extLst>
-              <a:ext uri="{96DAC541-7B7A-43D3-8B79-37D633B846F1}">
-                <asvg:svgBlip xmlns:asvg="http://schemas.microsoft.com/office/drawing/2016/SVG/main" r:embed="rId4"/>
-              </a:ext>
-            </a:extLst>
-          </a:blip>
+          <a:blip r:embed="rId1"/>
           <a:srcRect/>
-          <a:stretch/>
+          <a:stretch>
+            <a:fillRect/>
+          </a:stretch>
         </p:blipFill>
         <p:spPr>
           <a:xfrm>
@@ -4364,15 +4189,11 @@
           <p:nvPr/>
         </p:nvPicPr>
         <p:blipFill>
-          <a:blip r:embed="rId5">
-            <a:extLst>
-              <a:ext uri="{96DAC541-7B7A-43D3-8B79-37D633B846F1}">
-                <asvg:svgBlip xmlns:asvg="http://schemas.microsoft.com/office/drawing/2016/SVG/main" r:embed="rId6"/>
-              </a:ext>
-            </a:extLst>
-          </a:blip>
+          <a:blip r:embed="rId2"/>
           <a:srcRect/>
-          <a:stretch/>
+          <a:stretch>
+            <a:fillRect/>
+          </a:stretch>
         </p:blipFill>
         <p:spPr>
           <a:xfrm>
@@ -4399,7 +4220,6 @@
             <a:avLst/>
           </a:prstGeom>
           <a:noFill/>
-          <a:ln/>
         </p:spPr>
         <p:txBody>
           <a:bodyPr wrap="square" lIns="0" tIns="0" rIns="0" bIns="0" rtlCol="0" anchor="b"/>
@@ -4484,7 +4304,6 @@
             <a:avLst/>
           </a:prstGeom>
           <a:noFill/>
-          <a:ln/>
         </p:spPr>
         <p:txBody>
           <a:bodyPr wrap="square" lIns="0" tIns="0" rIns="0" bIns="0" rtlCol="0" anchor="t"/>
@@ -4520,7 +4339,7 @@
 
 <file path=ppt/slides/slide22.xml><?xml version="1.0" encoding="utf-8"?>
 <p:sld xmlns:a="http://schemas.openxmlformats.org/drawingml/2006/main" xmlns:r="http://schemas.openxmlformats.org/officeDocument/2006/relationships" xmlns:p="http://schemas.openxmlformats.org/presentationml/2006/main">
-  <p:cSld name="Slide 22">
+  <p:cSld>
     <p:bg>
       <p:bgPr>
         <a:solidFill>
@@ -4562,7 +4381,6 @@
           <a:solidFill>
             <a:srgbClr val="D3E2F2"/>
           </a:solidFill>
-          <a:ln/>
         </p:spPr>
         <p:txBody>
           <a:bodyPr wrap="square" lIns="508085" tIns="607335" rIns="508085" bIns="607335" rtlCol="0" anchor="ctr"/>
@@ -4586,9 +4404,11 @@
           <p:nvPr/>
         </p:nvPicPr>
         <p:blipFill>
-          <a:blip r:embed="rId3"/>
+          <a:blip r:embed="rId1"/>
           <a:srcRect l="1427"/>
-          <a:stretch/>
+          <a:stretch>
+            <a:fillRect/>
+          </a:stretch>
         </p:blipFill>
         <p:spPr>
           <a:xfrm>
@@ -4610,7 +4430,7 @@
 
 <file path=ppt/slides/slide23.xml><?xml version="1.0" encoding="utf-8"?>
 <p:sld xmlns:a="http://schemas.openxmlformats.org/drawingml/2006/main" xmlns:r="http://schemas.openxmlformats.org/officeDocument/2006/relationships" xmlns:p="http://schemas.openxmlformats.org/presentationml/2006/main">
-  <p:cSld name="Slide 23">
+  <p:cSld>
     <p:bg>
       <p:bgPr>
         <a:solidFill>
@@ -4652,7 +4472,6 @@
           <a:solidFill>
             <a:srgbClr val="D3E2F2"/>
           </a:solidFill>
-          <a:ln/>
         </p:spPr>
         <p:txBody>
           <a:bodyPr wrap="square" lIns="508085" tIns="607335" rIns="508085" bIns="607335" rtlCol="0" anchor="ctr"/>
@@ -4676,15 +4495,17 @@
           <p:nvPr/>
         </p:nvPicPr>
         <p:blipFill>
-          <a:blip r:embed="rId3">
+          <a:blip r:embed="rId1">
             <a:extLst>
               <a:ext uri="{96DAC541-7B7A-43D3-8B79-37D633B846F1}">
-                <asvg:svgBlip xmlns:asvg="http://schemas.microsoft.com/office/drawing/2016/SVG/main" r:embed="rId4"/>
+                <asvg:svgBlip xmlns:asvg="http://schemas.microsoft.com/office/drawing/2016/SVG/main" r:embed="rId2"/>
               </a:ext>
             </a:extLst>
           </a:blip>
           <a:srcRect/>
-          <a:stretch/>
+          <a:stretch>
+            <a:fillRect/>
+          </a:stretch>
         </p:blipFill>
         <p:spPr>
           <a:xfrm>
@@ -4713,7 +4534,6 @@
           <a:solidFill>
             <a:srgbClr val="FFFFFF"/>
           </a:solidFill>
-          <a:ln/>
         </p:spPr>
         <p:txBody>
           <a:bodyPr/>
@@ -4732,9 +4552,11 @@
           <p:nvPr/>
         </p:nvPicPr>
         <p:blipFill>
-          <a:blip r:embed="rId5"/>
+          <a:blip r:embed="rId3"/>
           <a:srcRect/>
-          <a:stretch/>
+          <a:stretch>
+            <a:fillRect/>
+          </a:stretch>
         </p:blipFill>
         <p:spPr>
           <a:xfrm>
@@ -4756,7 +4578,7 @@
 
 <file path=ppt/slides/slide24.xml><?xml version="1.0" encoding="utf-8"?>
 <p:sld xmlns:a="http://schemas.openxmlformats.org/drawingml/2006/main" xmlns:r="http://schemas.openxmlformats.org/officeDocument/2006/relationships" xmlns:p="http://schemas.openxmlformats.org/presentationml/2006/main">
-  <p:cSld name="Slide 24">
+  <p:cSld>
     <p:bg>
       <p:bgPr>
         <a:solidFill>
@@ -4798,7 +4620,6 @@
           <a:solidFill>
             <a:srgbClr val="D3E2F2"/>
           </a:solidFill>
-          <a:ln/>
         </p:spPr>
         <p:txBody>
           <a:bodyPr wrap="square" lIns="508085" tIns="607335" rIns="508085" bIns="607335" rtlCol="0" anchor="ctr"/>
@@ -4822,9 +4643,11 @@
           <p:nvPr/>
         </p:nvPicPr>
         <p:blipFill>
-          <a:blip r:embed="rId3"/>
+          <a:blip r:embed="rId1"/>
           <a:srcRect/>
-          <a:stretch/>
+          <a:stretch>
+            <a:fillRect/>
+          </a:stretch>
         </p:blipFill>
         <p:spPr>
           <a:xfrm>
@@ -4846,7 +4669,7 @@
 
 <file path=ppt/slides/slide25.xml><?xml version="1.0" encoding="utf-8"?>
 <p:sld xmlns:a="http://schemas.openxmlformats.org/drawingml/2006/main" xmlns:r="http://schemas.openxmlformats.org/officeDocument/2006/relationships" xmlns:p="http://schemas.openxmlformats.org/presentationml/2006/main">
-  <p:cSld name="Slide 25">
+  <p:cSld>
     <p:bg>
       <p:bgPr>
         <a:solidFill>
@@ -4888,7 +4711,6 @@
           <a:solidFill>
             <a:srgbClr val="D3E2F2"/>
           </a:solidFill>
-          <a:ln/>
         </p:spPr>
         <p:txBody>
           <a:bodyPr wrap="square" lIns="508085" tIns="607335" rIns="508085" bIns="607335" rtlCol="0" anchor="ctr"/>
@@ -4912,9 +4734,11 @@
           <p:nvPr/>
         </p:nvPicPr>
         <p:blipFill>
-          <a:blip r:embed="rId3"/>
+          <a:blip r:embed="rId1"/>
           <a:srcRect/>
-          <a:stretch/>
+          <a:stretch>
+            <a:fillRect/>
+          </a:stretch>
         </p:blipFill>
         <p:spPr>
           <a:xfrm>
@@ -4936,7 +4760,7 @@
 
 <file path=ppt/slides/slide26.xml><?xml version="1.0" encoding="utf-8"?>
 <p:sld xmlns:a="http://schemas.openxmlformats.org/drawingml/2006/main" xmlns:r="http://schemas.openxmlformats.org/officeDocument/2006/relationships" xmlns:p="http://schemas.openxmlformats.org/presentationml/2006/main">
-  <p:cSld name="Slide 26">
+  <p:cSld>
     <p:bg>
       <p:bgPr>
         <a:solidFill>
@@ -4978,7 +4802,6 @@
           <a:solidFill>
             <a:srgbClr val="D3E2F2"/>
           </a:solidFill>
-          <a:ln/>
         </p:spPr>
         <p:txBody>
           <a:bodyPr/>
@@ -4997,15 +4820,11 @@
           <p:nvPr/>
         </p:nvPicPr>
         <p:blipFill>
-          <a:blip r:embed="rId3">
-            <a:extLst>
-              <a:ext uri="{96DAC541-7B7A-43D3-8B79-37D633B846F1}">
-                <asvg:svgBlip xmlns:asvg="http://schemas.microsoft.com/office/drawing/2016/SVG/main" r:embed="rId4"/>
-              </a:ext>
-            </a:extLst>
-          </a:blip>
+          <a:blip r:embed="rId1"/>
           <a:srcRect/>
-          <a:stretch/>
+          <a:stretch>
+            <a:fillRect/>
+          </a:stretch>
         </p:blipFill>
         <p:spPr>
           <a:xfrm>
@@ -5026,15 +4845,11 @@
           <p:nvPr/>
         </p:nvPicPr>
         <p:blipFill>
-          <a:blip r:embed="rId5">
-            <a:extLst>
-              <a:ext uri="{96DAC541-7B7A-43D3-8B79-37D633B846F1}">
-                <asvg:svgBlip xmlns:asvg="http://schemas.microsoft.com/office/drawing/2016/SVG/main" r:embed="rId6"/>
-              </a:ext>
-            </a:extLst>
-          </a:blip>
+          <a:blip r:embed="rId2"/>
           <a:srcRect/>
-          <a:stretch/>
+          <a:stretch>
+            <a:fillRect/>
+          </a:stretch>
         </p:blipFill>
         <p:spPr>
           <a:xfrm>
@@ -5061,7 +4876,6 @@
             <a:avLst/>
           </a:prstGeom>
           <a:noFill/>
-          <a:ln/>
         </p:spPr>
         <p:txBody>
           <a:bodyPr wrap="square" lIns="0" tIns="0" rIns="0" bIns="0" rtlCol="0" anchor="b"/>
@@ -5125,7 +4939,6 @@
             <a:avLst/>
           </a:prstGeom>
           <a:noFill/>
-          <a:ln/>
         </p:spPr>
         <p:txBody>
           <a:bodyPr wrap="square" lIns="0" tIns="0" rIns="0" bIns="0" rtlCol="0" anchor="t"/>
@@ -5161,7 +4974,7 @@
 
 <file path=ppt/slides/slide27.xml><?xml version="1.0" encoding="utf-8"?>
 <p:sld xmlns:a="http://schemas.openxmlformats.org/drawingml/2006/main" xmlns:r="http://schemas.openxmlformats.org/officeDocument/2006/relationships" xmlns:p="http://schemas.openxmlformats.org/presentationml/2006/main">
-  <p:cSld name="Slide 27">
+  <p:cSld>
     <p:bg>
       <p:bgPr>
         <a:solidFill>
@@ -5199,7 +5012,6 @@
             <a:avLst/>
           </a:prstGeom>
           <a:noFill/>
-          <a:ln/>
         </p:spPr>
         <p:txBody>
           <a:bodyPr wrap="square" lIns="0" tIns="0" rIns="0" bIns="0" rtlCol="0" anchor="t"/>
@@ -5235,7 +5047,7 @@
 
 <file path=ppt/slides/slide3.xml><?xml version="1.0" encoding="utf-8"?>
 <p:sld xmlns:a="http://schemas.openxmlformats.org/drawingml/2006/main" xmlns:r="http://schemas.openxmlformats.org/officeDocument/2006/relationships" xmlns:p="http://schemas.openxmlformats.org/presentationml/2006/main">
-  <p:cSld name="Slide 3">
+  <p:cSld>
     <p:bg>
       <p:bgPr>
         <a:solidFill>
@@ -5266,14 +5078,13 @@
         </p:nvSpPr>
         <p:spPr>
           <a:xfrm>
-            <a:off x="473116" y="477046"/>
-            <a:ext cx="7742012" cy="628650"/>
+            <a:off x="473075" y="476885"/>
+            <a:ext cx="8149590" cy="628650"/>
           </a:xfrm>
           <a:prstGeom prst="rect">
             <a:avLst/>
           </a:prstGeom>
           <a:noFill/>
-          <a:ln/>
         </p:spPr>
         <p:txBody>
           <a:bodyPr wrap="square" lIns="0" tIns="0" rIns="0" bIns="0" rtlCol="0" anchor="t"/>
@@ -5314,7 +5125,6 @@
             <a:avLst/>
           </a:prstGeom>
           <a:noFill/>
-          <a:ln/>
         </p:spPr>
         <p:txBody>
           <a:bodyPr wrap="none" lIns="0" tIns="0" rIns="0" bIns="0" rtlCol="0" anchor="t">
@@ -5465,7 +5275,6 @@
             <a:avLst/>
           </a:prstGeom>
           <a:noFill/>
-          <a:ln/>
         </p:spPr>
         <p:txBody>
           <a:bodyPr wrap="none" lIns="0" tIns="0" rIns="0" bIns="0" rtlCol="0" anchor="t">
@@ -5611,7 +5420,7 @@
 
 <file path=ppt/slides/slide4.xml><?xml version="1.0" encoding="utf-8"?>
 <p:sld xmlns:a="http://schemas.openxmlformats.org/drawingml/2006/main" xmlns:r="http://schemas.openxmlformats.org/officeDocument/2006/relationships" xmlns:p="http://schemas.openxmlformats.org/presentationml/2006/main">
-  <p:cSld name="Slide 4">
+  <p:cSld>
     <p:bg>
       <p:bgPr>
         <a:solidFill>
@@ -5642,14 +5451,13 @@
         </p:nvSpPr>
         <p:spPr>
           <a:xfrm>
-            <a:off x="476547" y="477046"/>
-            <a:ext cx="2653127" cy="628650"/>
+            <a:off x="476250" y="476885"/>
+            <a:ext cx="3818890" cy="628650"/>
           </a:xfrm>
           <a:prstGeom prst="rect">
             <a:avLst/>
           </a:prstGeom>
           <a:noFill/>
-          <a:ln/>
         </p:spPr>
         <p:txBody>
           <a:bodyPr wrap="square" lIns="0" tIns="0" rIns="0" bIns="0" rtlCol="0" anchor="t"/>
@@ -5689,7 +5497,6 @@
             <a:avLst/>
           </a:prstGeom>
           <a:noFill/>
-          <a:ln/>
         </p:spPr>
         <p:txBody>
           <a:bodyPr wrap="square" lIns="0" tIns="0" rIns="0" bIns="0" rtlCol="0" anchor="t"/>
@@ -5722,6 +5529,14 @@
               </a:rPr>
               <a:t> </a:t>
             </a:r>
+            <a:endParaRPr lang="en-US" sz="1800" b="0" kern="0" spc="-12" dirty="0">
+              <a:solidFill>
+                <a:srgbClr val="FFC81A"/>
+              </a:solidFill>
+              <a:latin typeface="Young Serif" pitchFamily="34" charset="0"/>
+              <a:ea typeface="Young Serif" pitchFamily="34" charset="-122"/>
+              <a:cs typeface="Young Serif" pitchFamily="34" charset="-120"/>
+            </a:endParaRPr>
           </a:p>
           <a:p>
             <a:pPr algn="l">
@@ -5896,7 +5711,7 @@
 
 <file path=ppt/slides/slide5.xml><?xml version="1.0" encoding="utf-8"?>
 <p:sld xmlns:a="http://schemas.openxmlformats.org/drawingml/2006/main" xmlns:r="http://schemas.openxmlformats.org/officeDocument/2006/relationships" xmlns:p="http://schemas.openxmlformats.org/presentationml/2006/main">
-  <p:cSld name="Slide 5">
+  <p:cSld>
     <p:bg>
       <p:bgPr>
         <a:solidFill>
@@ -5934,7 +5749,6 @@
             <a:avLst/>
           </a:prstGeom>
           <a:noFill/>
-          <a:ln/>
         </p:spPr>
         <p:txBody>
           <a:bodyPr wrap="square" lIns="0" tIns="0" rIns="0" bIns="0" rtlCol="0" anchor="t"/>
@@ -5975,7 +5789,6 @@
             <a:avLst/>
           </a:prstGeom>
           <a:noFill/>
-          <a:ln/>
         </p:spPr>
         <p:txBody>
           <a:bodyPr wrap="square" lIns="0" tIns="0" rIns="0" bIns="0" rtlCol="0" anchor="t"/>
@@ -6016,7 +5829,6 @@
             <a:avLst/>
           </a:prstGeom>
           <a:noFill/>
-          <a:ln/>
         </p:spPr>
         <p:txBody>
           <a:bodyPr wrap="square" lIns="0" tIns="0" rIns="0" bIns="0" rtlCol="0" anchor="t"/>
@@ -6057,7 +5869,6 @@
             <a:avLst/>
           </a:prstGeom>
           <a:noFill/>
-          <a:ln/>
         </p:spPr>
         <p:txBody>
           <a:bodyPr wrap="square" lIns="0" tIns="0" rIns="0" bIns="0" rtlCol="0" anchor="t"/>
@@ -6117,7 +5928,6 @@
             <a:avLst/>
           </a:prstGeom>
           <a:noFill/>
-          <a:ln/>
         </p:spPr>
         <p:txBody>
           <a:bodyPr wrap="square" lIns="0" tIns="0" rIns="0" bIns="0" rtlCol="0" anchor="t"/>
@@ -6187,7 +5997,7 @@
 
 <file path=ppt/slides/slide6.xml><?xml version="1.0" encoding="utf-8"?>
 <p:sld xmlns:a="http://schemas.openxmlformats.org/drawingml/2006/main" xmlns:r="http://schemas.openxmlformats.org/officeDocument/2006/relationships" xmlns:p="http://schemas.openxmlformats.org/presentationml/2006/main">
-  <p:cSld name="Slide 6">
+  <p:cSld>
     <p:bg>
       <p:bgPr>
         <a:solidFill>
@@ -6225,7 +6035,6 @@
             <a:avLst/>
           </a:prstGeom>
           <a:noFill/>
-          <a:ln/>
         </p:spPr>
         <p:txBody>
           <a:bodyPr wrap="square" lIns="0" tIns="0" rIns="0" bIns="0" rtlCol="0" anchor="t"/>
@@ -6311,7 +6120,6 @@
             <a:avLst/>
           </a:prstGeom>
           <a:noFill/>
-          <a:ln/>
         </p:spPr>
         <p:txBody>
           <a:bodyPr wrap="square" lIns="0" tIns="0" rIns="0" bIns="0" rtlCol="0" anchor="t"/>
@@ -6352,7 +6160,6 @@
             <a:avLst/>
           </a:prstGeom>
           <a:noFill/>
-          <a:ln/>
         </p:spPr>
         <p:txBody>
           <a:bodyPr wrap="square" lIns="0" tIns="0" rIns="0" bIns="0" rtlCol="0" anchor="t"/>
@@ -6404,7 +6211,6 @@
             <a:avLst/>
           </a:prstGeom>
           <a:noFill/>
-          <a:ln/>
         </p:spPr>
         <p:txBody>
           <a:bodyPr wrap="square" lIns="0" tIns="0" rIns="0" bIns="0" rtlCol="0" anchor="t"/>
@@ -6456,7 +6262,6 @@
             <a:avLst/>
           </a:prstGeom>
           <a:noFill/>
-          <a:ln/>
         </p:spPr>
         <p:txBody>
           <a:bodyPr wrap="square" lIns="0" tIns="0" rIns="0" bIns="0" rtlCol="0" anchor="t"/>
@@ -6508,7 +6313,6 @@
             <a:avLst/>
           </a:prstGeom>
           <a:noFill/>
-          <a:ln/>
         </p:spPr>
         <p:txBody>
           <a:bodyPr wrap="square" lIns="0" tIns="0" rIns="0" bIns="0" rtlCol="0" anchor="t"/>
@@ -6560,7 +6364,6 @@
             <a:avLst/>
           </a:prstGeom>
           <a:noFill/>
-          <a:ln/>
         </p:spPr>
         <p:txBody>
           <a:bodyPr wrap="square" lIns="0" tIns="0" rIns="0" bIns="0" rtlCol="0" anchor="t"/>
@@ -6607,7 +6410,7 @@
 
 <file path=ppt/slides/slide7.xml><?xml version="1.0" encoding="utf-8"?>
 <p:sld xmlns:a="http://schemas.openxmlformats.org/drawingml/2006/main" xmlns:r="http://schemas.openxmlformats.org/officeDocument/2006/relationships" xmlns:p="http://schemas.openxmlformats.org/presentationml/2006/main">
-  <p:cSld name="Slide 7">
+  <p:cSld>
     <p:bg>
       <p:bgPr>
         <a:solidFill>
@@ -6649,7 +6452,6 @@
           <a:solidFill>
             <a:srgbClr val="D3E2F2"/>
           </a:solidFill>
-          <a:ln/>
         </p:spPr>
         <p:txBody>
           <a:bodyPr/>
@@ -6662,6 +6464,37 @@
       <p:pic>
         <p:nvPicPr>
           <p:cNvPr id="4" name="Image 0" descr="https://pitch-assets-ccb95893-de3f-4266-973c-20049231b248.s3.eu-west-1.amazonaws.com/5dcc46ea-b7bf-4260-bb86-b13c582aa479?pitch-bytes=4476&amp;pitch-content-type=image%2Fsvg%2Bxml"/>
+          <p:cNvPicPr>
+            <a:picLocks noChangeAspect="1"/>
+          </p:cNvPicPr>
+          <p:nvPr/>
+        </p:nvPicPr>
+        <p:blipFill>
+          <a:blip r:embed="rId1">
+            <a:extLst>
+              <a:ext uri="{96DAC541-7B7A-43D3-8B79-37D633B846F1}">
+                <asvg:svgBlip xmlns:asvg="http://schemas.microsoft.com/office/drawing/2016/SVG/main" r:embed="rId2"/>
+              </a:ext>
+            </a:extLst>
+          </a:blip>
+          <a:srcRect/>
+          <a:stretch>
+            <a:fillRect/>
+          </a:stretch>
+        </p:blipFill>
+        <p:spPr>
+          <a:xfrm>
+            <a:off x="5047258" y="1318911"/>
+            <a:ext cx="3621641" cy="2503228"/>
+          </a:xfrm>
+          <a:prstGeom prst="rect">
+            <a:avLst/>
+          </a:prstGeom>
+        </p:spPr>
+      </p:pic>
+      <p:pic>
+        <p:nvPicPr>
+          <p:cNvPr id="5" name="Image 1" descr="https://pitch-assets-ccb95893-de3f-4266-973c-20049231b248.s3.eu-west-1.amazonaws.com/2045e0f6-faef-4461-ba78-73e3e16c7ac9?pitch-bytes=1577&amp;pitch-content-type=image%2Fsvg%2Bxml"/>
           <p:cNvPicPr>
             <a:picLocks noChangeAspect="1"/>
           </p:cNvPicPr>
@@ -6676,63 +6509,35 @@
             </a:extLst>
           </a:blip>
           <a:srcRect/>
-          <a:stretch/>
+          <a:stretch>
+            <a:fillRect/>
+          </a:stretch>
         </p:blipFill>
         <p:spPr>
           <a:xfrm>
-            <a:off x="5047258" y="1318911"/>
-            <a:ext cx="3621641" cy="2503228"/>
+            <a:off x="4710442" y="3086861"/>
+            <a:ext cx="1868381" cy="2057400"/>
           </a:xfrm>
           <a:prstGeom prst="rect">
             <a:avLst/>
           </a:prstGeom>
         </p:spPr>
       </p:pic>
-      <p:pic>
-        <p:nvPicPr>
-          <p:cNvPr id="5" name="Image 1" descr="https://pitch-assets-ccb95893-de3f-4266-973c-20049231b248.s3.eu-west-1.amazonaws.com/2045e0f6-faef-4461-ba78-73e3e16c7ac9?pitch-bytes=1577&amp;pitch-content-type=image%2Fsvg%2Bxml"/>
-          <p:cNvPicPr>
-            <a:picLocks noChangeAspect="1"/>
-          </p:cNvPicPr>
-          <p:nvPr/>
-        </p:nvPicPr>
-        <p:blipFill>
-          <a:blip r:embed="rId5">
-            <a:extLst>
-              <a:ext uri="{96DAC541-7B7A-43D3-8B79-37D633B846F1}">
-                <asvg:svgBlip xmlns:asvg="http://schemas.microsoft.com/office/drawing/2016/SVG/main" r:embed="rId6"/>
-              </a:ext>
-            </a:extLst>
-          </a:blip>
-          <a:srcRect/>
-          <a:stretch/>
-        </p:blipFill>
-        <p:spPr>
-          <a:xfrm>
-            <a:off x="4710442" y="3086861"/>
-            <a:ext cx="1868381" cy="2057400"/>
+      <p:sp>
+        <p:nvSpPr>
+          <p:cNvPr id="6" name="Text 1"/>
+          <p:cNvSpPr/>
+          <p:nvPr/>
+        </p:nvSpPr>
+        <p:spPr>
+          <a:xfrm>
+            <a:off x="476250" y="2157410"/>
+            <a:ext cx="3619202" cy="822911"/>
           </a:xfrm>
           <a:prstGeom prst="rect">
             <a:avLst/>
           </a:prstGeom>
-        </p:spPr>
-      </p:pic>
-      <p:sp>
-        <p:nvSpPr>
-          <p:cNvPr id="6" name="Text 1"/>
-          <p:cNvSpPr/>
-          <p:nvPr/>
-        </p:nvSpPr>
-        <p:spPr>
-          <a:xfrm>
-            <a:off x="476250" y="2157410"/>
-            <a:ext cx="3619202" cy="822911"/>
-          </a:xfrm>
-          <a:prstGeom prst="rect">
-            <a:avLst/>
-          </a:prstGeom>
           <a:noFill/>
-          <a:ln/>
         </p:spPr>
         <p:txBody>
           <a:bodyPr wrap="square" lIns="0" tIns="0" rIns="0" bIns="0" rtlCol="0" anchor="b"/>
@@ -6817,7 +6622,6 @@
             <a:avLst/>
           </a:prstGeom>
           <a:noFill/>
-          <a:ln/>
         </p:spPr>
         <p:txBody>
           <a:bodyPr wrap="square" lIns="0" tIns="0" rIns="0" bIns="0" rtlCol="0" anchor="t"/>
@@ -6853,7 +6657,7 @@
 
 <file path=ppt/slides/slide8.xml><?xml version="1.0" encoding="utf-8"?>
 <p:sld xmlns:a="http://schemas.openxmlformats.org/drawingml/2006/main" xmlns:r="http://schemas.openxmlformats.org/officeDocument/2006/relationships" xmlns:p="http://schemas.openxmlformats.org/presentationml/2006/main">
-  <p:cSld name="Slide 8">
+  <p:cSld>
     <p:bg>
       <p:bgPr>
         <a:solidFill>
@@ -6895,7 +6699,6 @@
           <a:solidFill>
             <a:srgbClr val="D3E2F2"/>
           </a:solidFill>
-          <a:ln/>
         </p:spPr>
         <p:txBody>
           <a:bodyPr/>
@@ -6908,6 +6711,37 @@
       <p:pic>
         <p:nvPicPr>
           <p:cNvPr id="4" name="Image 0" descr="https://pitch-assets-ccb95893-de3f-4266-973c-20049231b248.s3.eu-west-1.amazonaws.com/5dcc46ea-b7bf-4260-bb86-b13c582aa479?pitch-bytes=4476&amp;pitch-content-type=image%2Fsvg%2Bxml"/>
+          <p:cNvPicPr>
+            <a:picLocks noChangeAspect="1"/>
+          </p:cNvPicPr>
+          <p:nvPr/>
+        </p:nvPicPr>
+        <p:blipFill>
+          <a:blip r:embed="rId1">
+            <a:extLst>
+              <a:ext uri="{96DAC541-7B7A-43D3-8B79-37D633B846F1}">
+                <asvg:svgBlip xmlns:asvg="http://schemas.microsoft.com/office/drawing/2016/SVG/main" r:embed="rId2"/>
+              </a:ext>
+            </a:extLst>
+          </a:blip>
+          <a:srcRect/>
+          <a:stretch>
+            <a:fillRect/>
+          </a:stretch>
+        </p:blipFill>
+        <p:spPr>
+          <a:xfrm>
+            <a:off x="5047258" y="1318911"/>
+            <a:ext cx="3621641" cy="2503228"/>
+          </a:xfrm>
+          <a:prstGeom prst="rect">
+            <a:avLst/>
+          </a:prstGeom>
+        </p:spPr>
+      </p:pic>
+      <p:pic>
+        <p:nvPicPr>
+          <p:cNvPr id="5" name="Image 1" descr="https://pitch-assets-ccb95893-de3f-4266-973c-20049231b248.s3.eu-west-1.amazonaws.com/2045e0f6-faef-4461-ba78-73e3e16c7ac9?pitch-bytes=1577&amp;pitch-content-type=image%2Fsvg%2Bxml"/>
           <p:cNvPicPr>
             <a:picLocks noChangeAspect="1"/>
           </p:cNvPicPr>
@@ -6922,63 +6756,35 @@
             </a:extLst>
           </a:blip>
           <a:srcRect/>
-          <a:stretch/>
+          <a:stretch>
+            <a:fillRect/>
+          </a:stretch>
         </p:blipFill>
         <p:spPr>
           <a:xfrm>
-            <a:off x="5047258" y="1318911"/>
-            <a:ext cx="3621641" cy="2503228"/>
+            <a:off x="4710442" y="3086861"/>
+            <a:ext cx="1868381" cy="2057400"/>
           </a:xfrm>
           <a:prstGeom prst="rect">
             <a:avLst/>
           </a:prstGeom>
         </p:spPr>
       </p:pic>
-      <p:pic>
-        <p:nvPicPr>
-          <p:cNvPr id="5" name="Image 1" descr="https://pitch-assets-ccb95893-de3f-4266-973c-20049231b248.s3.eu-west-1.amazonaws.com/2045e0f6-faef-4461-ba78-73e3e16c7ac9?pitch-bytes=1577&amp;pitch-content-type=image%2Fsvg%2Bxml"/>
-          <p:cNvPicPr>
-            <a:picLocks noChangeAspect="1"/>
-          </p:cNvPicPr>
-          <p:nvPr/>
-        </p:nvPicPr>
-        <p:blipFill>
-          <a:blip r:embed="rId5">
-            <a:extLst>
-              <a:ext uri="{96DAC541-7B7A-43D3-8B79-37D633B846F1}">
-                <asvg:svgBlip xmlns:asvg="http://schemas.microsoft.com/office/drawing/2016/SVG/main" r:embed="rId6"/>
-              </a:ext>
-            </a:extLst>
-          </a:blip>
-          <a:srcRect/>
-          <a:stretch/>
-        </p:blipFill>
-        <p:spPr>
-          <a:xfrm>
-            <a:off x="4710442" y="3086861"/>
-            <a:ext cx="1868381" cy="2057400"/>
+      <p:sp>
+        <p:nvSpPr>
+          <p:cNvPr id="6" name="Text 1"/>
+          <p:cNvSpPr/>
+          <p:nvPr/>
+        </p:nvSpPr>
+        <p:spPr>
+          <a:xfrm>
+            <a:off x="476250" y="2146520"/>
+            <a:ext cx="3619202" cy="1371519"/>
           </a:xfrm>
           <a:prstGeom prst="rect">
             <a:avLst/>
           </a:prstGeom>
-        </p:spPr>
-      </p:pic>
-      <p:sp>
-        <p:nvSpPr>
-          <p:cNvPr id="6" name="Text 1"/>
-          <p:cNvSpPr/>
-          <p:nvPr/>
-        </p:nvSpPr>
-        <p:spPr>
-          <a:xfrm>
-            <a:off x="476250" y="2146520"/>
-            <a:ext cx="3619202" cy="1371519"/>
-          </a:xfrm>
-          <a:prstGeom prst="rect">
-            <a:avLst/>
-          </a:prstGeom>
           <a:noFill/>
-          <a:ln/>
         </p:spPr>
         <p:txBody>
           <a:bodyPr wrap="square" lIns="0" tIns="0" rIns="0" bIns="0" rtlCol="0" anchor="b"/>
@@ -7063,7 +6869,6 @@
             <a:avLst/>
           </a:prstGeom>
           <a:noFill/>
-          <a:ln/>
         </p:spPr>
         <p:txBody>
           <a:bodyPr wrap="square" lIns="0" tIns="0" rIns="0" bIns="0" rtlCol="0" anchor="t"/>
@@ -7099,7 +6904,7 @@
 
 <file path=ppt/slides/slide9.xml><?xml version="1.0" encoding="utf-8"?>
 <p:sld xmlns:a="http://schemas.openxmlformats.org/drawingml/2006/main" xmlns:r="http://schemas.openxmlformats.org/officeDocument/2006/relationships" xmlns:p="http://schemas.openxmlformats.org/presentationml/2006/main">
-  <p:cSld name="Slide 9">
+  <p:cSld>
     <p:bg>
       <p:bgPr>
         <a:solidFill>
@@ -7141,7 +6946,6 @@
           <a:solidFill>
             <a:srgbClr val="D3E2F2"/>
           </a:solidFill>
-          <a:ln/>
         </p:spPr>
         <p:txBody>
           <a:bodyPr/>
@@ -7166,7 +6970,6 @@
             <a:avLst/>
           </a:prstGeom>
           <a:noFill/>
-          <a:ln/>
         </p:spPr>
         <p:txBody>
           <a:bodyPr wrap="square" lIns="0" tIns="0" rIns="0" bIns="0" rtlCol="0" anchor="b"/>
@@ -7230,7 +7033,6 @@
             <a:avLst/>
           </a:prstGeom>
           <a:noFill/>
-          <a:ln/>
         </p:spPr>
         <p:txBody>
           <a:bodyPr wrap="square" lIns="0" tIns="0" rIns="0" bIns="0" rtlCol="0" anchor="t"/>
@@ -7265,6 +7067,37 @@
           <p:nvPr/>
         </p:nvPicPr>
         <p:blipFill>
+          <a:blip r:embed="rId1">
+            <a:extLst>
+              <a:ext uri="{96DAC541-7B7A-43D3-8B79-37D633B846F1}">
+                <asvg:svgBlip xmlns:asvg="http://schemas.microsoft.com/office/drawing/2016/SVG/main" r:embed="rId2"/>
+              </a:ext>
+            </a:extLst>
+          </a:blip>
+          <a:srcRect/>
+          <a:stretch>
+            <a:fillRect/>
+          </a:stretch>
+        </p:blipFill>
+        <p:spPr>
+          <a:xfrm>
+            <a:off x="5047258" y="1318911"/>
+            <a:ext cx="3621641" cy="2503228"/>
+          </a:xfrm>
+          <a:prstGeom prst="rect">
+            <a:avLst/>
+          </a:prstGeom>
+        </p:spPr>
+      </p:pic>
+      <p:pic>
+        <p:nvPicPr>
+          <p:cNvPr id="7" name="Image 1" descr="https://pitch-assets-ccb95893-de3f-4266-973c-20049231b248.s3.eu-west-1.amazonaws.com/2045e0f6-faef-4461-ba78-73e3e16c7ac9?pitch-bytes=1577&amp;pitch-content-type=image%2Fsvg%2Bxml"/>
+          <p:cNvPicPr>
+            <a:picLocks noChangeAspect="1"/>
+          </p:cNvPicPr>
+          <p:nvPr/>
+        </p:nvPicPr>
+        <p:blipFill>
           <a:blip r:embed="rId3">
             <a:extLst>
               <a:ext uri="{96DAC541-7B7A-43D3-8B79-37D633B846F1}">
@@ -7273,36 +7106,9 @@
             </a:extLst>
           </a:blip>
           <a:srcRect/>
-          <a:stretch/>
-        </p:blipFill>
-        <p:spPr>
-          <a:xfrm>
-            <a:off x="5047258" y="1318911"/>
-            <a:ext cx="3621641" cy="2503228"/>
-          </a:xfrm>
-          <a:prstGeom prst="rect">
-            <a:avLst/>
-          </a:prstGeom>
-        </p:spPr>
-      </p:pic>
-      <p:pic>
-        <p:nvPicPr>
-          <p:cNvPr id="7" name="Image 1" descr="https://pitch-assets-ccb95893-de3f-4266-973c-20049231b248.s3.eu-west-1.amazonaws.com/2045e0f6-faef-4461-ba78-73e3e16c7ac9?pitch-bytes=1577&amp;pitch-content-type=image%2Fsvg%2Bxml"/>
-          <p:cNvPicPr>
-            <a:picLocks noChangeAspect="1"/>
-          </p:cNvPicPr>
-          <p:nvPr/>
-        </p:nvPicPr>
-        <p:blipFill>
-          <a:blip r:embed="rId5">
-            <a:extLst>
-              <a:ext uri="{96DAC541-7B7A-43D3-8B79-37D633B846F1}">
-                <asvg:svgBlip xmlns:asvg="http://schemas.microsoft.com/office/drawing/2016/SVG/main" r:embed="rId6"/>
-              </a:ext>
-            </a:extLst>
-          </a:blip>
-          <a:srcRect/>
-          <a:stretch/>
+          <a:stretch>
+            <a:fillRect/>
+          </a:stretch>
         </p:blipFill>
         <p:spPr>
           <a:xfrm>
@@ -7365,7 +7171,7 @@
     </a:clrScheme>
     <a:fontScheme name="Office">
       <a:majorFont>
-        <a:latin typeface="Calibri Light" panose="020F0302020204030204"/>
+        <a:latin typeface="Calibri Light"/>
         <a:ea typeface=""/>
         <a:cs typeface=""/>
         <a:font script="Jpan" typeface="游ゴシック Light"/>
@@ -7398,26 +7204,9 @@
         <a:font script="Viet" typeface="Times New Roman"/>
         <a:font script="Uigh" typeface="Microsoft Uighur"/>
         <a:font script="Geor" typeface="Sylfaen"/>
-        <a:font script="Armn" typeface="Arial"/>
-        <a:font script="Bugi" typeface="Leelawadee UI"/>
-        <a:font script="Bopo" typeface="Microsoft JhengHei"/>
-        <a:font script="Java" typeface="Javanese Text"/>
-        <a:font script="Lisu" typeface="Segoe UI"/>
-        <a:font script="Mymr" typeface="Myanmar Text"/>
-        <a:font script="Nkoo" typeface="Ebrima"/>
-        <a:font script="Olck" typeface="Nirmala UI"/>
-        <a:font script="Osma" typeface="Ebrima"/>
-        <a:font script="Phag" typeface="Phagspa"/>
-        <a:font script="Syrn" typeface="Estrangelo Edessa"/>
-        <a:font script="Syrj" typeface="Estrangelo Edessa"/>
-        <a:font script="Syre" typeface="Estrangelo Edessa"/>
-        <a:font script="Sora" typeface="Nirmala UI"/>
-        <a:font script="Tale" typeface="Microsoft Tai Le"/>
-        <a:font script="Talu" typeface="Microsoft New Tai Lue"/>
-        <a:font script="Tfng" typeface="Ebrima"/>
       </a:majorFont>
       <a:minorFont>
-        <a:latin typeface="Calibri" panose="020F0502020204030204"/>
+        <a:latin typeface="Calibri"/>
         <a:ea typeface=""/>
         <a:cs typeface=""/>
         <a:font script="Jpan" typeface="游ゴシック"/>
@@ -7450,23 +7239,6 @@
         <a:font script="Viet" typeface="Arial"/>
         <a:font script="Uigh" typeface="Microsoft Uighur"/>
         <a:font script="Geor" typeface="Sylfaen"/>
-        <a:font script="Armn" typeface="Arial"/>
-        <a:font script="Bugi" typeface="Leelawadee UI"/>
-        <a:font script="Bopo" typeface="Microsoft JhengHei"/>
-        <a:font script="Java" typeface="Javanese Text"/>
-        <a:font script="Lisu" typeface="Segoe UI"/>
-        <a:font script="Mymr" typeface="Myanmar Text"/>
-        <a:font script="Nkoo" typeface="Ebrima"/>
-        <a:font script="Olck" typeface="Nirmala UI"/>
-        <a:font script="Osma" typeface="Ebrima"/>
-        <a:font script="Phag" typeface="Phagspa"/>
-        <a:font script="Syrn" typeface="Estrangelo Edessa"/>
-        <a:font script="Syrj" typeface="Estrangelo Edessa"/>
-        <a:font script="Syre" typeface="Estrangelo Edessa"/>
-        <a:font script="Sora" typeface="Nirmala UI"/>
-        <a:font script="Tale" typeface="Microsoft Tai Le"/>
-        <a:font script="Talu" typeface="Microsoft New Tai Lue"/>
-        <a:font script="Tfng" typeface="Ebrima"/>
       </a:minorFont>
     </a:fontScheme>
     <a:fmtScheme name="Office">
@@ -7607,8 +7379,6 @@
       </a:bgFillStyleLst>
     </a:fmtScheme>
   </a:themeElements>
-  <a:objectDefaults/>
-  <a:extraClrSchemeLst/>
   <a:extLst>
     <a:ext uri="{05A4C25C-085E-4340-85A3-A5531E510DB2}">
       <thm15:themeFamily xmlns:thm15="http://schemas.microsoft.com/office/thememl/2012/main" name="Office Theme" id="{62F939B6-93AF-4DB8-9C6B-D6C7DFDC589F}" vid="{4A3C46E8-61CC-4603-A589-7422A47A8E4A}"/>
@@ -7660,7 +7430,7 @@
     </a:clrScheme>
     <a:fontScheme name="Office">
       <a:majorFont>
-        <a:latin typeface="Aptos Display" panose="02110004020202020204"/>
+        <a:latin typeface="Aptos Display"/>
         <a:ea typeface=""/>
         <a:cs typeface=""/>
         <a:font script="Jpan" typeface="游ゴシック Light"/>
@@ -7693,26 +7463,9 @@
         <a:font script="Viet" typeface="Times New Roman"/>
         <a:font script="Uigh" typeface="Microsoft Uighur"/>
         <a:font script="Geor" typeface="Sylfaen"/>
-        <a:font script="Armn" typeface="Arial"/>
-        <a:font script="Bugi" typeface="Leelawadee UI"/>
-        <a:font script="Bopo" typeface="Microsoft JhengHei"/>
-        <a:font script="Java" typeface="Javanese Text"/>
-        <a:font script="Lisu" typeface="Segoe UI"/>
-        <a:font script="Mymr" typeface="Myanmar Text"/>
-        <a:font script="Nkoo" typeface="Ebrima"/>
-        <a:font script="Olck" typeface="Nirmala UI"/>
-        <a:font script="Osma" typeface="Ebrima"/>
-        <a:font script="Phag" typeface="Phagspa"/>
-        <a:font script="Syrn" typeface="Estrangelo Edessa"/>
-        <a:font script="Syrj" typeface="Estrangelo Edessa"/>
-        <a:font script="Syre" typeface="Estrangelo Edessa"/>
-        <a:font script="Sora" typeface="Nirmala UI"/>
-        <a:font script="Tale" typeface="Microsoft Tai Le"/>
-        <a:font script="Talu" typeface="Microsoft New Tai Lue"/>
-        <a:font script="Tfng" typeface="Ebrima"/>
       </a:majorFont>
       <a:minorFont>
-        <a:latin typeface="Aptos" panose="02110004020202020204"/>
+        <a:latin typeface="Aptos"/>
         <a:ea typeface=""/>
         <a:cs typeface=""/>
         <a:font script="Jpan" typeface="游ゴシック"/>
@@ -7745,23 +7498,6 @@
         <a:font script="Viet" typeface="Arial"/>
         <a:font script="Uigh" typeface="Microsoft Uighur"/>
         <a:font script="Geor" typeface="Sylfaen"/>
-        <a:font script="Armn" typeface="Arial"/>
-        <a:font script="Bugi" typeface="Leelawadee UI"/>
-        <a:font script="Bopo" typeface="Microsoft JhengHei"/>
-        <a:font script="Java" typeface="Javanese Text"/>
-        <a:font script="Lisu" typeface="Segoe UI"/>
-        <a:font script="Mymr" typeface="Myanmar Text"/>
-        <a:font script="Nkoo" typeface="Ebrima"/>
-        <a:font script="Olck" typeface="Nirmala UI"/>
-        <a:font script="Osma" typeface="Ebrima"/>
-        <a:font script="Phag" typeface="Phagspa"/>
-        <a:font script="Syrn" typeface="Estrangelo Edessa"/>
-        <a:font script="Syrj" typeface="Estrangelo Edessa"/>
-        <a:font script="Syre" typeface="Estrangelo Edessa"/>
-        <a:font script="Sora" typeface="Nirmala UI"/>
-        <a:font script="Tale" typeface="Microsoft Tai Le"/>
-        <a:font script="Talu" typeface="Microsoft New Tai Lue"/>
-        <a:font script="Tfng" typeface="Ebrima"/>
       </a:minorFont>
     </a:fontScheme>
     <a:fmtScheme name="Office">
@@ -7923,10 +7659,9 @@
       </a:style>
     </a:lnDef>
   </a:objectDefaults>
-  <a:extraClrSchemeLst/>
   <a:extLst>
     <a:ext uri="{05A4C25C-085E-4340-85A3-A5531E510DB2}">
-      <thm15:themeFamily xmlns:thm15="http://schemas.microsoft.com/office/thememl/2012/main" name="Office Theme" id="{2E142A2C-CD16-42D6-873A-C26D2A0506FA}" vid="{1BDDFF52-6CD6-40A5-AB3C-68EB2F1E4D0A}"/>
+      <thm15:themeFamily xmlns:thm15="http://schemas.microsoft.com/office/thememl/2012/main" name="Office Theme" id="{62F939B6-93AF-4DB8-9C6B-D6C7DFDC589F}" vid="{4A3C46E8-61CC-4603-A589-7422A47A8E4A}"/>
     </a:ext>
   </a:extLst>
 </a:theme>

</xml_diff>